<commit_message>
Update Arduino IO Compendium.pptx
Has been checked.
</commit_message>
<xml_diff>
--- a/Arduino IO Compendium.pptx
+++ b/Arduino IO Compendium.pptx
@@ -659,7 +659,7 @@
           <a:p>
             <a:fld id="{12D35354-3C70-45FE-A7BC-FEBCE88C825A}" type="datetime8">
               <a:rPr lang="en-US" smtClean="0"/>
-              <a:t>5/8/2022 11:58 AM</a:t>
+              <a:t>5/8/2022 8:40 PM</a:t>
             </a:fld>
             <a:endParaRPr lang="en-US"/>
           </a:p>
@@ -857,7 +857,7 @@
           <a:p>
             <a:fld id="{DE273977-2B4E-4BD8-8226-CAEE823F3008}" type="datetime8">
               <a:rPr lang="en-US" smtClean="0"/>
-              <a:t>5/8/2022 11:58 AM</a:t>
+              <a:t>5/8/2022 8:40 PM</a:t>
             </a:fld>
             <a:endParaRPr lang="en-US"/>
           </a:p>
@@ -1065,7 +1065,7 @@
           <a:p>
             <a:fld id="{7E2DC526-9E9D-4998-8C50-0541226B08CF}" type="datetime8">
               <a:rPr lang="en-US" smtClean="0"/>
-              <a:t>5/8/2022 11:58 AM</a:t>
+              <a:t>5/8/2022 8:40 PM</a:t>
             </a:fld>
             <a:endParaRPr lang="en-US"/>
           </a:p>
@@ -1263,7 +1263,7 @@
           <a:p>
             <a:fld id="{956EF2D3-783C-4E62-879C-6E42AA097112}" type="datetime8">
               <a:rPr lang="en-US" smtClean="0"/>
-              <a:t>5/8/2022 11:58 AM</a:t>
+              <a:t>5/8/2022 8:40 PM</a:t>
             </a:fld>
             <a:endParaRPr lang="en-US"/>
           </a:p>
@@ -1538,7 +1538,7 @@
           <a:p>
             <a:fld id="{CEEB4330-8AFB-48E3-B890-210D056A958B}" type="datetime8">
               <a:rPr lang="en-US" smtClean="0"/>
-              <a:t>5/8/2022 11:58 AM</a:t>
+              <a:t>5/8/2022 8:40 PM</a:t>
             </a:fld>
             <a:endParaRPr lang="en-US"/>
           </a:p>
@@ -1803,7 +1803,7 @@
           <a:p>
             <a:fld id="{66E23911-0252-40BE-BBB8-760394743E26}" type="datetime8">
               <a:rPr lang="en-US" smtClean="0"/>
-              <a:t>5/8/2022 11:58 AM</a:t>
+              <a:t>5/8/2022 8:40 PM</a:t>
             </a:fld>
             <a:endParaRPr lang="en-US"/>
           </a:p>
@@ -2215,7 +2215,7 @@
           <a:p>
             <a:fld id="{BBB6AC5D-77FB-46F6-9132-21FF30B4912F}" type="datetime8">
               <a:rPr lang="en-US" smtClean="0"/>
-              <a:t>5/8/2022 11:58 AM</a:t>
+              <a:t>5/8/2022 8:40 PM</a:t>
             </a:fld>
             <a:endParaRPr lang="en-US"/>
           </a:p>
@@ -2356,7 +2356,7 @@
           <a:p>
             <a:fld id="{6017FBC6-3D6B-4CF2-A705-4BC9E7D4582C}" type="datetime8">
               <a:rPr lang="en-US" smtClean="0"/>
-              <a:t>5/8/2022 11:58 AM</a:t>
+              <a:t>5/8/2022 8:40 PM</a:t>
             </a:fld>
             <a:endParaRPr lang="en-US"/>
           </a:p>
@@ -2737,7 +2737,7 @@
           <a:p>
             <a:fld id="{0D1B1BD9-FAAE-42CF-9C1C-24872CEE05A7}" type="datetime8">
               <a:rPr lang="en-US" smtClean="0"/>
-              <a:t>5/8/2022 11:58 AM</a:t>
+              <a:t>5/8/2022 8:40 PM</a:t>
             </a:fld>
             <a:endParaRPr lang="en-US"/>
           </a:p>
@@ -3025,7 +3025,7 @@
           <a:p>
             <a:fld id="{63B48E98-414D-4169-A026-380BA4A7A23F}" type="datetime8">
               <a:rPr lang="en-US" smtClean="0"/>
-              <a:t>5/8/2022 11:58 AM</a:t>
+              <a:t>5/8/2022 8:40 PM</a:t>
             </a:fld>
             <a:endParaRPr lang="en-US"/>
           </a:p>
@@ -3266,7 +3266,7 @@
           <a:p>
             <a:fld id="{9D52C73E-D6AD-4984-9C4A-C03CB437FD89}" type="datetime8">
               <a:rPr lang="en-US" smtClean="0"/>
-              <a:t>5/8/2022 11:58 AM</a:t>
+              <a:t>5/8/2022 8:40 PM</a:t>
             </a:fld>
             <a:endParaRPr lang="en-US"/>
           </a:p>
@@ -7683,8 +7683,8 @@
         </p:nvSpPr>
         <p:spPr>
           <a:xfrm>
-            <a:off x="8479765" y="1484463"/>
-            <a:ext cx="3536831" cy="4131333"/>
+            <a:off x="8195095" y="1484463"/>
+            <a:ext cx="3821501" cy="4131333"/>
           </a:xfrm>
           <a:prstGeom prst="rect">
             <a:avLst/>
@@ -7730,8 +7730,24 @@
           <a:p>
             <a:r>
               <a:rPr lang="en-US" dirty="0"/>
-              <a:t>PORTS are designated B, C, and D. PORTS are banks of I/O on the microcontroller and for advanced programming this can be important</a:t>
+              <a:t>PORTS are banks of I/O on the microcontroller and for advanced </a:t>
             </a:r>
+            <a:r>
+              <a:rPr lang="en-US" sz="1600" dirty="0"/>
+              <a:t>programming the port can be important.</a:t>
+            </a:r>
+          </a:p>
+          <a:p>
+            <a:endParaRPr lang="en-US" dirty="0"/>
+          </a:p>
+          <a:p>
+            <a:r>
+              <a:rPr lang="en-US" dirty="0"/>
+              <a:t>PORTS are designated B, C, and D.</a:t>
+            </a:r>
+          </a:p>
+          <a:p>
+            <a:endParaRPr lang="en-US" dirty="0"/>
           </a:p>
           <a:p>
             <a:r>
@@ -7740,9 +7756,12 @@
             </a:r>
           </a:p>
           <a:p>
+            <a:endParaRPr lang="en-US" dirty="0"/>
+          </a:p>
+          <a:p>
             <a:r>
               <a:rPr lang="en-US" dirty="0"/>
-              <a:t>Finally there are interrupts available on a lot of pins.</a:t>
+              <a:t>Finally there are interrupts available on a lot of the pins.</a:t>
             </a:r>
           </a:p>
         </p:txBody>
@@ -8252,41 +8271,6 @@
                                   </p:childTnLst>
                                 </p:cTn>
                               </p:par>
-                              <p:par>
-                                <p:cTn id="8" presetID="22" presetClass="entr" presetSubtype="4" fill="hold" grpId="0" nodeType="withEffect">
-                                  <p:stCondLst>
-                                    <p:cond delay="0"/>
-                                  </p:stCondLst>
-                                  <p:childTnLst>
-                                    <p:set>
-                                      <p:cBhvr>
-                                        <p:cTn id="9" dur="1" fill="hold">
-                                          <p:stCondLst>
-                                            <p:cond delay="0"/>
-                                          </p:stCondLst>
-                                        </p:cTn>
-                                        <p:tgtEl>
-                                          <p:spTgt spid="8"/>
-                                        </p:tgtEl>
-                                        <p:attrNameLst>
-                                          <p:attrName>style.visibility</p:attrName>
-                                        </p:attrNameLst>
-                                      </p:cBhvr>
-                                      <p:to>
-                                        <p:strVal val="visible"/>
-                                      </p:to>
-                                    </p:set>
-                                    <p:animEffect transition="in" filter="wipe(down)">
-                                      <p:cBhvr>
-                                        <p:cTn id="10" dur="500"/>
-                                        <p:tgtEl>
-                                          <p:spTgt spid="8"/>
-                                        </p:tgtEl>
-                                      </p:cBhvr>
-                                    </p:animEffect>
-                                  </p:childTnLst>
-                                </p:cTn>
-                              </p:par>
                             </p:childTnLst>
                           </p:cTn>
                         </p:par>
@@ -8294,122 +8278,26 @@
                     </p:cTn>
                   </p:par>
                   <p:par>
-                    <p:cTn id="11" fill="hold">
+                    <p:cTn id="8" fill="hold">
                       <p:stCondLst>
                         <p:cond delay="indefinite"/>
                       </p:stCondLst>
                       <p:childTnLst>
                         <p:par>
-                          <p:cTn id="12" fill="hold">
+                          <p:cTn id="9" fill="hold">
                             <p:stCondLst>
                               <p:cond delay="0"/>
                             </p:stCondLst>
                             <p:childTnLst>
                               <p:par>
-                                <p:cTn id="13" presetID="10" presetClass="entr" presetSubtype="0" fill="hold" nodeType="clickEffect">
+                                <p:cTn id="10" presetID="10" presetClass="entr" presetSubtype="0" fill="hold" nodeType="clickEffect">
                                   <p:stCondLst>
                                     <p:cond delay="0"/>
                                   </p:stCondLst>
                                   <p:childTnLst>
                                     <p:set>
                                       <p:cBhvr>
-                                        <p:cTn id="14" dur="1" fill="hold">
-                                          <p:stCondLst>
-                                            <p:cond delay="0"/>
-                                          </p:stCondLst>
-                                        </p:cTn>
-                                        <p:tgtEl>
-                                          <p:spTgt spid="4">
-                                            <p:txEl>
-                                              <p:pRg st="2" end="2"/>
-                                            </p:txEl>
-                                          </p:spTgt>
-                                        </p:tgtEl>
-                                        <p:attrNameLst>
-                                          <p:attrName>style.visibility</p:attrName>
-                                        </p:attrNameLst>
-                                      </p:cBhvr>
-                                      <p:to>
-                                        <p:strVal val="visible"/>
-                                      </p:to>
-                                    </p:set>
-                                    <p:animEffect transition="in" filter="fade">
-                                      <p:cBhvr>
-                                        <p:cTn id="15" dur="500"/>
-                                        <p:tgtEl>
-                                          <p:spTgt spid="4">
-                                            <p:txEl>
-                                              <p:pRg st="2" end="2"/>
-                                            </p:txEl>
-                                          </p:spTgt>
-                                        </p:tgtEl>
-                                      </p:cBhvr>
-                                    </p:animEffect>
-                                  </p:childTnLst>
-                                </p:cTn>
-                              </p:par>
-                              <p:par>
-                                <p:cTn id="16" presetID="22" presetClass="entr" presetSubtype="4" fill="hold" grpId="0" nodeType="withEffect">
-                                  <p:stCondLst>
-                                    <p:cond delay="0"/>
-                                  </p:stCondLst>
-                                  <p:childTnLst>
-                                    <p:set>
-                                      <p:cBhvr>
-                                        <p:cTn id="17" dur="1" fill="hold">
-                                          <p:stCondLst>
-                                            <p:cond delay="0"/>
-                                          </p:stCondLst>
-                                        </p:cTn>
-                                        <p:tgtEl>
-                                          <p:spTgt spid="11"/>
-                                        </p:tgtEl>
-                                        <p:attrNameLst>
-                                          <p:attrName>style.visibility</p:attrName>
-                                        </p:attrNameLst>
-                                      </p:cBhvr>
-                                      <p:to>
-                                        <p:strVal val="visible"/>
-                                      </p:to>
-                                    </p:set>
-                                    <p:animEffect transition="in" filter="wipe(down)">
-                                      <p:cBhvr>
-                                        <p:cTn id="18" dur="500"/>
-                                        <p:tgtEl>
-                                          <p:spTgt spid="11"/>
-                                        </p:tgtEl>
-                                      </p:cBhvr>
-                                    </p:animEffect>
-                                  </p:childTnLst>
-                                </p:cTn>
-                              </p:par>
-                            </p:childTnLst>
-                          </p:cTn>
-                        </p:par>
-                      </p:childTnLst>
-                    </p:cTn>
-                  </p:par>
-                  <p:par>
-                    <p:cTn id="19" fill="hold">
-                      <p:stCondLst>
-                        <p:cond delay="indefinite"/>
-                      </p:stCondLst>
-                      <p:childTnLst>
-                        <p:par>
-                          <p:cTn id="20" fill="hold">
-                            <p:stCondLst>
-                              <p:cond delay="0"/>
-                            </p:stCondLst>
-                            <p:childTnLst>
-                              <p:par>
-                                <p:cTn id="21" presetID="10" presetClass="entr" presetSubtype="0" fill="hold" nodeType="clickEffect">
-                                  <p:stCondLst>
-                                    <p:cond delay="0"/>
-                                  </p:stCondLst>
-                                  <p:childTnLst>
-                                    <p:set>
-                                      <p:cBhvr>
-                                        <p:cTn id="22" dur="1" fill="hold">
+                                        <p:cTn id="11" dur="1" fill="hold">
                                           <p:stCondLst>
                                             <p:cond delay="0"/>
                                           </p:stCondLst>
@@ -8431,7 +8319,7 @@
                                     </p:set>
                                     <p:animEffect transition="in" filter="fade">
                                       <p:cBhvr>
-                                        <p:cTn id="23" dur="500"/>
+                                        <p:cTn id="12" dur="500"/>
                                         <p:tgtEl>
                                           <p:spTgt spid="4">
                                             <p:txEl>
@@ -8445,14 +8333,206 @@
                                 </p:cTn>
                               </p:par>
                               <p:par>
-                                <p:cTn id="24" presetID="22" presetClass="entr" presetSubtype="4" fill="hold" grpId="0" nodeType="withEffect">
+                                <p:cTn id="13" presetID="22" presetClass="entr" presetSubtype="4" fill="hold" grpId="0" nodeType="withEffect">
                                   <p:stCondLst>
                                     <p:cond delay="0"/>
                                   </p:stCondLst>
                                   <p:childTnLst>
                                     <p:set>
                                       <p:cBhvr>
-                                        <p:cTn id="25" dur="1" fill="hold">
+                                        <p:cTn id="14" dur="1" fill="hold">
+                                          <p:stCondLst>
+                                            <p:cond delay="0"/>
+                                          </p:stCondLst>
+                                        </p:cTn>
+                                        <p:tgtEl>
+                                          <p:spTgt spid="8"/>
+                                        </p:tgtEl>
+                                        <p:attrNameLst>
+                                          <p:attrName>style.visibility</p:attrName>
+                                        </p:attrNameLst>
+                                      </p:cBhvr>
+                                      <p:to>
+                                        <p:strVal val="visible"/>
+                                      </p:to>
+                                    </p:set>
+                                    <p:animEffect transition="in" filter="wipe(down)">
+                                      <p:cBhvr>
+                                        <p:cTn id="15" dur="500"/>
+                                        <p:tgtEl>
+                                          <p:spTgt spid="8"/>
+                                        </p:tgtEl>
+                                      </p:cBhvr>
+                                    </p:animEffect>
+                                  </p:childTnLst>
+                                </p:cTn>
+                              </p:par>
+                            </p:childTnLst>
+                          </p:cTn>
+                        </p:par>
+                      </p:childTnLst>
+                    </p:cTn>
+                  </p:par>
+                  <p:par>
+                    <p:cTn id="16" fill="hold">
+                      <p:stCondLst>
+                        <p:cond delay="indefinite"/>
+                      </p:stCondLst>
+                      <p:childTnLst>
+                        <p:par>
+                          <p:cTn id="17" fill="hold">
+                            <p:stCondLst>
+                              <p:cond delay="0"/>
+                            </p:stCondLst>
+                            <p:childTnLst>
+                              <p:par>
+                                <p:cTn id="18" presetID="10" presetClass="entr" presetSubtype="0" fill="hold" nodeType="clickEffect">
+                                  <p:stCondLst>
+                                    <p:cond delay="0"/>
+                                  </p:stCondLst>
+                                  <p:childTnLst>
+                                    <p:set>
+                                      <p:cBhvr>
+                                        <p:cTn id="19" dur="1" fill="hold">
+                                          <p:stCondLst>
+                                            <p:cond delay="0"/>
+                                          </p:stCondLst>
+                                        </p:cTn>
+                                        <p:tgtEl>
+                                          <p:spTgt spid="4">
+                                            <p:txEl>
+                                              <p:pRg st="5" end="5"/>
+                                            </p:txEl>
+                                          </p:spTgt>
+                                        </p:tgtEl>
+                                        <p:attrNameLst>
+                                          <p:attrName>style.visibility</p:attrName>
+                                        </p:attrNameLst>
+                                      </p:cBhvr>
+                                      <p:to>
+                                        <p:strVal val="visible"/>
+                                      </p:to>
+                                    </p:set>
+                                    <p:animEffect transition="in" filter="fade">
+                                      <p:cBhvr>
+                                        <p:cTn id="20" dur="500"/>
+                                        <p:tgtEl>
+                                          <p:spTgt spid="4">
+                                            <p:txEl>
+                                              <p:pRg st="5" end="5"/>
+                                            </p:txEl>
+                                          </p:spTgt>
+                                        </p:tgtEl>
+                                      </p:cBhvr>
+                                    </p:animEffect>
+                                  </p:childTnLst>
+                                </p:cTn>
+                              </p:par>
+                              <p:par>
+                                <p:cTn id="21" presetID="22" presetClass="entr" presetSubtype="4" fill="hold" grpId="0" nodeType="withEffect">
+                                  <p:stCondLst>
+                                    <p:cond delay="0"/>
+                                  </p:stCondLst>
+                                  <p:childTnLst>
+                                    <p:set>
+                                      <p:cBhvr>
+                                        <p:cTn id="22" dur="1" fill="hold">
+                                          <p:stCondLst>
+                                            <p:cond delay="0"/>
+                                          </p:stCondLst>
+                                        </p:cTn>
+                                        <p:tgtEl>
+                                          <p:spTgt spid="11"/>
+                                        </p:tgtEl>
+                                        <p:attrNameLst>
+                                          <p:attrName>style.visibility</p:attrName>
+                                        </p:attrNameLst>
+                                      </p:cBhvr>
+                                      <p:to>
+                                        <p:strVal val="visible"/>
+                                      </p:to>
+                                    </p:set>
+                                    <p:animEffect transition="in" filter="wipe(down)">
+                                      <p:cBhvr>
+                                        <p:cTn id="23" dur="500"/>
+                                        <p:tgtEl>
+                                          <p:spTgt spid="11"/>
+                                        </p:tgtEl>
+                                      </p:cBhvr>
+                                    </p:animEffect>
+                                  </p:childTnLst>
+                                </p:cTn>
+                              </p:par>
+                            </p:childTnLst>
+                          </p:cTn>
+                        </p:par>
+                      </p:childTnLst>
+                    </p:cTn>
+                  </p:par>
+                  <p:par>
+                    <p:cTn id="24" fill="hold">
+                      <p:stCondLst>
+                        <p:cond delay="indefinite"/>
+                      </p:stCondLst>
+                      <p:childTnLst>
+                        <p:par>
+                          <p:cTn id="25" fill="hold">
+                            <p:stCondLst>
+                              <p:cond delay="0"/>
+                            </p:stCondLst>
+                            <p:childTnLst>
+                              <p:par>
+                                <p:cTn id="26" presetID="10" presetClass="entr" presetSubtype="0" fill="hold" nodeType="clickEffect">
+                                  <p:stCondLst>
+                                    <p:cond delay="0"/>
+                                  </p:stCondLst>
+                                  <p:childTnLst>
+                                    <p:set>
+                                      <p:cBhvr>
+                                        <p:cTn id="27" dur="1" fill="hold">
+                                          <p:stCondLst>
+                                            <p:cond delay="0"/>
+                                          </p:stCondLst>
+                                        </p:cTn>
+                                        <p:tgtEl>
+                                          <p:spTgt spid="4">
+                                            <p:txEl>
+                                              <p:pRg st="7" end="7"/>
+                                            </p:txEl>
+                                          </p:spTgt>
+                                        </p:tgtEl>
+                                        <p:attrNameLst>
+                                          <p:attrName>style.visibility</p:attrName>
+                                        </p:attrNameLst>
+                                      </p:cBhvr>
+                                      <p:to>
+                                        <p:strVal val="visible"/>
+                                      </p:to>
+                                    </p:set>
+                                    <p:animEffect transition="in" filter="fade">
+                                      <p:cBhvr>
+                                        <p:cTn id="28" dur="500"/>
+                                        <p:tgtEl>
+                                          <p:spTgt spid="4">
+                                            <p:txEl>
+                                              <p:pRg st="7" end="7"/>
+                                            </p:txEl>
+                                          </p:spTgt>
+                                        </p:tgtEl>
+                                      </p:cBhvr>
+                                    </p:animEffect>
+                                  </p:childTnLst>
+                                </p:cTn>
+                              </p:par>
+                              <p:par>
+                                <p:cTn id="29" presetID="22" presetClass="entr" presetSubtype="4" fill="hold" grpId="0" nodeType="withEffect">
+                                  <p:stCondLst>
+                                    <p:cond delay="0"/>
+                                  </p:stCondLst>
+                                  <p:childTnLst>
+                                    <p:set>
+                                      <p:cBhvr>
+                                        <p:cTn id="30" dur="1" fill="hold">
                                           <p:stCondLst>
                                             <p:cond delay="0"/>
                                           </p:stCondLst>
@@ -8470,7 +8550,7 @@
                                     </p:set>
                                     <p:animEffect transition="in" filter="wipe(down)">
                                       <p:cBhvr>
-                                        <p:cTn id="26" dur="500"/>
+                                        <p:cTn id="31" dur="500"/>
                                         <p:tgtEl>
                                           <p:spTgt spid="12"/>
                                         </p:tgtEl>
@@ -10682,7 +10762,7 @@
           <p:nvPr>
             <p:extLst>
               <p:ext uri="{D42A27DB-BD31-4B8C-83A1-F6EECF244321}">
-                <p14:modId xmlns:p14="http://schemas.microsoft.com/office/powerpoint/2010/main" val="1923733488"/>
+                <p14:modId xmlns:p14="http://schemas.microsoft.com/office/powerpoint/2010/main" val="1535110050"/>
               </p:ext>
             </p:extLst>
           </p:nvPr>
@@ -11130,7 +11210,10 @@
                     <a:bodyPr/>
                     <a:lstStyle/>
                     <a:p>
-                      <a:endParaRPr lang="en-US" dirty="0"/>
+                      <a:r>
+                        <a:rPr lang="en-US" dirty="0"/>
+                        <a:t>Also known as a ‘potentiometer’ ( or pot for short)</a:t>
+                      </a:r>
                     </a:p>
                   </a:txBody>
                   <a:tcPr/>
@@ -17640,14 +17723,14 @@
           <p:nvPr>
             <p:extLst>
               <p:ext uri="{D42A27DB-BD31-4B8C-83A1-F6EECF244321}">
-                <p14:modId xmlns:p14="http://schemas.microsoft.com/office/powerpoint/2010/main" val="25925389"/>
+                <p14:modId xmlns:p14="http://schemas.microsoft.com/office/powerpoint/2010/main" val="3177946039"/>
               </p:ext>
             </p:extLst>
           </p:nvPr>
         </p:nvGraphicFramePr>
         <p:xfrm>
           <a:off x="415505" y="395237"/>
-          <a:ext cx="11360989" cy="6207421"/>
+          <a:ext cx="11360989" cy="5933101"/>
         </p:xfrm>
         <a:graphic>
           <a:graphicData uri="http://schemas.openxmlformats.org/drawingml/2006/table">
@@ -18142,7 +18225,7 @@
                       </a:pPr>
                       <a:r>
                         <a:rPr lang="en-US" b="0" dirty="0"/>
-                        <a:t>Technically the signal is not PWM as only the time spent high is important not the high/low ratio.</a:t>
+                        <a:t>Only the time spent high is important. </a:t>
                       </a:r>
                     </a:p>
                     <a:p>
@@ -18165,7 +18248,15 @@
                       </a:pPr>
                       <a:r>
                         <a:rPr lang="en-US" b="0" dirty="0"/>
-                        <a:t>9g refers to the weight in grams!</a:t>
+                        <a:t>Use the &lt;</a:t>
+                      </a:r>
+                      <a:r>
+                        <a:rPr lang="en-US" b="0" dirty="0" err="1"/>
+                        <a:t>Servo.h</a:t>
+                      </a:r>
+                      <a:r>
+                        <a:rPr lang="en-US" b="0" dirty="0"/>
+                        <a:t>&gt; library – it has built in error checking.</a:t>
                       </a:r>
                     </a:p>
                     <a:p>
@@ -18304,6 +18395,37 @@
                           <a:srgbClr val="0070C0"/>
                         </a:solidFill>
                       </a:endParaRPr>
+                    </a:p>
+                    <a:p>
+                      <a:pPr marL="0" marR="0" lvl="0" indent="0" algn="l" defTabSz="914400" rtl="0" eaLnBrk="1" fontAlgn="auto" latinLnBrk="0" hangingPunct="1">
+                        <a:lnSpc>
+                          <a:spcPct val="100000"/>
+                        </a:lnSpc>
+                        <a:spcBef>
+                          <a:spcPts val="0"/>
+                        </a:spcBef>
+                        <a:spcAft>
+                          <a:spcPts val="0"/>
+                        </a:spcAft>
+                        <a:buClrTx/>
+                        <a:buSzTx/>
+                        <a:buFontTx/>
+                        <a:buNone/>
+                        <a:tabLst/>
+                        <a:defRPr/>
+                      </a:pPr>
+                      <a:r>
+                        <a:rPr lang="en-US" b="1" dirty="0">
+                          <a:solidFill>
+                            <a:srgbClr val="0070C0"/>
+                          </a:solidFill>
+                        </a:rPr>
+                        <a:t>Trivia : </a:t>
+                      </a:r>
+                      <a:r>
+                        <a:rPr lang="en-US" b="0" dirty="0"/>
+                        <a:t>9g refers to the weight in grams!</a:t>
+                      </a:r>
                     </a:p>
                   </a:txBody>
                   <a:tcPr/>
@@ -30289,7 +30411,7 @@
                   <a:schemeClr val="tx1"/>
                 </a:solidFill>
               </a:rPr>
-              <a:t>(and others) are names given to individual products in the Arduino. </a:t>
+              <a:t>(and others) are names given to individual products in the Arduino family. </a:t>
             </a:r>
           </a:p>
           <a:p>
@@ -31677,6 +31799,317 @@
       </p:sp>
       <p:sp>
         <p:nvSpPr>
+          <p:cNvPr id="9" name="Subtitle 2">
+            <a:extLst>
+              <a:ext uri="{FF2B5EF4-FFF2-40B4-BE49-F238E27FC236}">
+                <a16:creationId xmlns:a16="http://schemas.microsoft.com/office/drawing/2014/main" id="{1E25AA03-1616-196B-526C-882CFD5E07C2}"/>
+              </a:ext>
+            </a:extLst>
+          </p:cNvPr>
+          <p:cNvSpPr txBox="1">
+            <a:spLocks/>
+          </p:cNvSpPr>
+          <p:nvPr/>
+        </p:nvSpPr>
+        <p:spPr>
+          <a:xfrm>
+            <a:off x="10480356" y="406404"/>
+            <a:ext cx="1357223" cy="558771"/>
+          </a:xfrm>
+          <a:prstGeom prst="rect">
+            <a:avLst/>
+          </a:prstGeom>
+        </p:spPr>
+        <p:txBody>
+          <a:bodyPr vert="horz" lIns="91440" tIns="45720" rIns="91440" bIns="45720" rtlCol="0">
+            <a:noAutofit/>
+          </a:bodyPr>
+          <a:lstStyle>
+            <a:lvl1pPr marL="0" indent="0" algn="ctr" defTabSz="914400" rtl="0" eaLnBrk="1" latinLnBrk="0" hangingPunct="1">
+              <a:lnSpc>
+                <a:spcPct val="90000"/>
+              </a:lnSpc>
+              <a:spcBef>
+                <a:spcPts val="1000"/>
+              </a:spcBef>
+              <a:buFont typeface="Arial" panose="020B0604020202020204" pitchFamily="34" charset="0"/>
+              <a:buNone/>
+              <a:defRPr sz="2400" kern="1200">
+                <a:solidFill>
+                  <a:schemeClr val="tx1"/>
+                </a:solidFill>
+                <a:latin typeface="+mn-lt"/>
+                <a:ea typeface="+mn-ea"/>
+                <a:cs typeface="+mn-cs"/>
+              </a:defRPr>
+            </a:lvl1pPr>
+            <a:lvl2pPr marL="457200" indent="0" algn="ctr" defTabSz="914400" rtl="0" eaLnBrk="1" latinLnBrk="0" hangingPunct="1">
+              <a:lnSpc>
+                <a:spcPct val="90000"/>
+              </a:lnSpc>
+              <a:spcBef>
+                <a:spcPts val="500"/>
+              </a:spcBef>
+              <a:buFont typeface="Arial" panose="020B0604020202020204" pitchFamily="34" charset="0"/>
+              <a:buNone/>
+              <a:defRPr sz="2000" kern="1200">
+                <a:solidFill>
+                  <a:schemeClr val="tx1"/>
+                </a:solidFill>
+                <a:latin typeface="+mn-lt"/>
+                <a:ea typeface="+mn-ea"/>
+                <a:cs typeface="+mn-cs"/>
+              </a:defRPr>
+            </a:lvl2pPr>
+            <a:lvl3pPr marL="914400" indent="0" algn="ctr" defTabSz="914400" rtl="0" eaLnBrk="1" latinLnBrk="0" hangingPunct="1">
+              <a:lnSpc>
+                <a:spcPct val="90000"/>
+              </a:lnSpc>
+              <a:spcBef>
+                <a:spcPts val="500"/>
+              </a:spcBef>
+              <a:buFont typeface="Arial" panose="020B0604020202020204" pitchFamily="34" charset="0"/>
+              <a:buNone/>
+              <a:defRPr sz="1800" kern="1200">
+                <a:solidFill>
+                  <a:schemeClr val="tx1"/>
+                </a:solidFill>
+                <a:latin typeface="+mn-lt"/>
+                <a:ea typeface="+mn-ea"/>
+                <a:cs typeface="+mn-cs"/>
+              </a:defRPr>
+            </a:lvl3pPr>
+            <a:lvl4pPr marL="1371600" indent="0" algn="ctr" defTabSz="914400" rtl="0" eaLnBrk="1" latinLnBrk="0" hangingPunct="1">
+              <a:lnSpc>
+                <a:spcPct val="90000"/>
+              </a:lnSpc>
+              <a:spcBef>
+                <a:spcPts val="500"/>
+              </a:spcBef>
+              <a:buFont typeface="Arial" panose="020B0604020202020204" pitchFamily="34" charset="0"/>
+              <a:buNone/>
+              <a:defRPr sz="1600" kern="1200">
+                <a:solidFill>
+                  <a:schemeClr val="tx1"/>
+                </a:solidFill>
+                <a:latin typeface="+mn-lt"/>
+                <a:ea typeface="+mn-ea"/>
+                <a:cs typeface="+mn-cs"/>
+              </a:defRPr>
+            </a:lvl4pPr>
+            <a:lvl5pPr marL="1828800" indent="0" algn="ctr" defTabSz="914400" rtl="0" eaLnBrk="1" latinLnBrk="0" hangingPunct="1">
+              <a:lnSpc>
+                <a:spcPct val="90000"/>
+              </a:lnSpc>
+              <a:spcBef>
+                <a:spcPts val="500"/>
+              </a:spcBef>
+              <a:buFont typeface="Arial" panose="020B0604020202020204" pitchFamily="34" charset="0"/>
+              <a:buNone/>
+              <a:defRPr sz="1600" kern="1200">
+                <a:solidFill>
+                  <a:schemeClr val="tx1"/>
+                </a:solidFill>
+                <a:latin typeface="+mn-lt"/>
+                <a:ea typeface="+mn-ea"/>
+                <a:cs typeface="+mn-cs"/>
+              </a:defRPr>
+            </a:lvl5pPr>
+            <a:lvl6pPr marL="2286000" indent="0" algn="ctr" defTabSz="914400" rtl="0" eaLnBrk="1" latinLnBrk="0" hangingPunct="1">
+              <a:lnSpc>
+                <a:spcPct val="90000"/>
+              </a:lnSpc>
+              <a:spcBef>
+                <a:spcPts val="500"/>
+              </a:spcBef>
+              <a:buFont typeface="Arial" panose="020B0604020202020204" pitchFamily="34" charset="0"/>
+              <a:buNone/>
+              <a:defRPr sz="1600" kern="1200">
+                <a:solidFill>
+                  <a:schemeClr val="tx1"/>
+                </a:solidFill>
+                <a:latin typeface="+mn-lt"/>
+                <a:ea typeface="+mn-ea"/>
+                <a:cs typeface="+mn-cs"/>
+              </a:defRPr>
+            </a:lvl6pPr>
+            <a:lvl7pPr marL="2743200" indent="0" algn="ctr" defTabSz="914400" rtl="0" eaLnBrk="1" latinLnBrk="0" hangingPunct="1">
+              <a:lnSpc>
+                <a:spcPct val="90000"/>
+              </a:lnSpc>
+              <a:spcBef>
+                <a:spcPts val="500"/>
+              </a:spcBef>
+              <a:buFont typeface="Arial" panose="020B0604020202020204" pitchFamily="34" charset="0"/>
+              <a:buNone/>
+              <a:defRPr sz="1600" kern="1200">
+                <a:solidFill>
+                  <a:schemeClr val="tx1"/>
+                </a:solidFill>
+                <a:latin typeface="+mn-lt"/>
+                <a:ea typeface="+mn-ea"/>
+                <a:cs typeface="+mn-cs"/>
+              </a:defRPr>
+            </a:lvl7pPr>
+            <a:lvl8pPr marL="3200400" indent="0" algn="ctr" defTabSz="914400" rtl="0" eaLnBrk="1" latinLnBrk="0" hangingPunct="1">
+              <a:lnSpc>
+                <a:spcPct val="90000"/>
+              </a:lnSpc>
+              <a:spcBef>
+                <a:spcPts val="500"/>
+              </a:spcBef>
+              <a:buFont typeface="Arial" panose="020B0604020202020204" pitchFamily="34" charset="0"/>
+              <a:buNone/>
+              <a:defRPr sz="1600" kern="1200">
+                <a:solidFill>
+                  <a:schemeClr val="tx1"/>
+                </a:solidFill>
+                <a:latin typeface="+mn-lt"/>
+                <a:ea typeface="+mn-ea"/>
+                <a:cs typeface="+mn-cs"/>
+              </a:defRPr>
+            </a:lvl8pPr>
+            <a:lvl9pPr marL="3657600" indent="0" algn="ctr" defTabSz="914400" rtl="0" eaLnBrk="1" latinLnBrk="0" hangingPunct="1">
+              <a:lnSpc>
+                <a:spcPct val="90000"/>
+              </a:lnSpc>
+              <a:spcBef>
+                <a:spcPts val="500"/>
+              </a:spcBef>
+              <a:buFont typeface="Arial" panose="020B0604020202020204" pitchFamily="34" charset="0"/>
+              <a:buNone/>
+              <a:defRPr sz="1600" kern="1200">
+                <a:solidFill>
+                  <a:schemeClr val="tx1"/>
+                </a:solidFill>
+                <a:latin typeface="+mn-lt"/>
+                <a:ea typeface="+mn-ea"/>
+                <a:cs typeface="+mn-cs"/>
+              </a:defRPr>
+            </a:lvl9pPr>
+          </a:lstStyle>
+          <a:p>
+            <a:endParaRPr lang="en-US" sz="3200" b="1" dirty="0">
+              <a:solidFill>
+                <a:schemeClr val="accent1">
+                  <a:lumMod val="60000"/>
+                  <a:lumOff val="40000"/>
+                </a:schemeClr>
+              </a:solidFill>
+              <a:latin typeface="MERG_Logo" pitchFamily="2" charset="0"/>
+            </a:endParaRPr>
+          </a:p>
+        </p:txBody>
+      </p:sp>
+      <p:pic>
+        <p:nvPicPr>
+          <p:cNvPr id="10" name="Picture 9">
+            <a:extLst>
+              <a:ext uri="{FF2B5EF4-FFF2-40B4-BE49-F238E27FC236}">
+                <a16:creationId xmlns:a16="http://schemas.microsoft.com/office/drawing/2014/main" id="{411C9DF4-8351-85C6-48AB-6581D3BCC601}"/>
+              </a:ext>
+            </a:extLst>
+          </p:cNvPr>
+          <p:cNvPicPr>
+            <a:picLocks noChangeAspect="1"/>
+          </p:cNvPicPr>
+          <p:nvPr/>
+        </p:nvPicPr>
+        <p:blipFill>
+          <a:blip r:embed="rId2" cstate="email">
+            <a:extLst>
+              <a:ext uri="{28A0092B-C50C-407E-A947-70E740481C1C}">
+                <a14:useLocalDpi xmlns:a14="http://schemas.microsoft.com/office/drawing/2010/main"/>
+              </a:ext>
+            </a:extLst>
+          </a:blip>
+          <a:stretch>
+            <a:fillRect/>
+          </a:stretch>
+        </p:blipFill>
+        <p:spPr>
+          <a:xfrm>
+            <a:off x="10749400" y="6239363"/>
+            <a:ext cx="1116784" cy="496968"/>
+          </a:xfrm>
+          <a:prstGeom prst="rect">
+            <a:avLst/>
+          </a:prstGeom>
+        </p:spPr>
+      </p:pic>
+      <p:pic>
+        <p:nvPicPr>
+          <p:cNvPr id="3" name="Picture 2">
+            <a:extLst>
+              <a:ext uri="{FF2B5EF4-FFF2-40B4-BE49-F238E27FC236}">
+                <a16:creationId xmlns:a16="http://schemas.microsoft.com/office/drawing/2014/main" id="{F625BC8B-FBCB-7B78-8927-67F8FB799916}"/>
+              </a:ext>
+            </a:extLst>
+          </p:cNvPr>
+          <p:cNvPicPr>
+            <a:picLocks noChangeAspect="1"/>
+          </p:cNvPicPr>
+          <p:nvPr/>
+        </p:nvPicPr>
+        <p:blipFill>
+          <a:blip r:embed="rId3" cstate="email">
+            <a:extLst>
+              <a:ext uri="{28A0092B-C50C-407E-A947-70E740481C1C}">
+                <a14:useLocalDpi xmlns:a14="http://schemas.microsoft.com/office/drawing/2010/main"/>
+              </a:ext>
+            </a:extLst>
+          </a:blip>
+          <a:stretch>
+            <a:fillRect/>
+          </a:stretch>
+        </p:blipFill>
+        <p:spPr>
+          <a:xfrm>
+            <a:off x="685801" y="1628519"/>
+            <a:ext cx="7509294" cy="3669672"/>
+          </a:xfrm>
+          <a:prstGeom prst="rect">
+            <a:avLst/>
+          </a:prstGeom>
+        </p:spPr>
+      </p:pic>
+      <p:sp>
+        <p:nvSpPr>
+          <p:cNvPr id="11" name="TextBox 10">
+            <a:extLst>
+              <a:ext uri="{FF2B5EF4-FFF2-40B4-BE49-F238E27FC236}">
+                <a16:creationId xmlns:a16="http://schemas.microsoft.com/office/drawing/2014/main" id="{78A1D33C-71B7-9D70-BDD5-BAF410E660D9}"/>
+              </a:ext>
+            </a:extLst>
+          </p:cNvPr>
+          <p:cNvSpPr txBox="1"/>
+          <p:nvPr/>
+        </p:nvSpPr>
+        <p:spPr>
+          <a:xfrm>
+            <a:off x="971171" y="6128442"/>
+            <a:ext cx="6094562" cy="338554"/>
+          </a:xfrm>
+          <a:prstGeom prst="rect">
+            <a:avLst/>
+          </a:prstGeom>
+          <a:noFill/>
+        </p:spPr>
+        <p:txBody>
+          <a:bodyPr wrap="square">
+            <a:spAutoFit/>
+          </a:bodyPr>
+          <a:lstStyle/>
+          <a:p>
+            <a:r>
+              <a:rPr lang="en-US" sz="1600" dirty="0"/>
+              <a:t>https://commons.wikimedia.org/wiki/File:Arduino-nano-pinout.png</a:t>
+            </a:r>
+          </a:p>
+        </p:txBody>
+      </p:sp>
+      <p:sp>
+        <p:nvSpPr>
           <p:cNvPr id="6" name="Rectangle 5">
             <a:extLst>
               <a:ext uri="{FF2B5EF4-FFF2-40B4-BE49-F238E27FC236}">
@@ -31689,7 +32122,7 @@
         </p:nvSpPr>
         <p:spPr>
           <a:xfrm>
-            <a:off x="2708695" y="5429461"/>
+            <a:off x="6535946" y="5156673"/>
             <a:ext cx="4771846" cy="919355"/>
           </a:xfrm>
           <a:prstGeom prst="rect">
@@ -31740,282 +32173,6 @@
           </a:p>
         </p:txBody>
       </p:sp>
-      <p:sp>
-        <p:nvSpPr>
-          <p:cNvPr id="9" name="Subtitle 2">
-            <a:extLst>
-              <a:ext uri="{FF2B5EF4-FFF2-40B4-BE49-F238E27FC236}">
-                <a16:creationId xmlns:a16="http://schemas.microsoft.com/office/drawing/2014/main" id="{1E25AA03-1616-196B-526C-882CFD5E07C2}"/>
-              </a:ext>
-            </a:extLst>
-          </p:cNvPr>
-          <p:cNvSpPr txBox="1">
-            <a:spLocks/>
-          </p:cNvSpPr>
-          <p:nvPr/>
-        </p:nvSpPr>
-        <p:spPr>
-          <a:xfrm>
-            <a:off x="10480356" y="406404"/>
-            <a:ext cx="1357223" cy="558771"/>
-          </a:xfrm>
-          <a:prstGeom prst="rect">
-            <a:avLst/>
-          </a:prstGeom>
-        </p:spPr>
-        <p:txBody>
-          <a:bodyPr vert="horz" lIns="91440" tIns="45720" rIns="91440" bIns="45720" rtlCol="0">
-            <a:noAutofit/>
-          </a:bodyPr>
-          <a:lstStyle>
-            <a:lvl1pPr marL="0" indent="0" algn="ctr" defTabSz="914400" rtl="0" eaLnBrk="1" latinLnBrk="0" hangingPunct="1">
-              <a:lnSpc>
-                <a:spcPct val="90000"/>
-              </a:lnSpc>
-              <a:spcBef>
-                <a:spcPts val="1000"/>
-              </a:spcBef>
-              <a:buFont typeface="Arial" panose="020B0604020202020204" pitchFamily="34" charset="0"/>
-              <a:buNone/>
-              <a:defRPr sz="2400" kern="1200">
-                <a:solidFill>
-                  <a:schemeClr val="tx1"/>
-                </a:solidFill>
-                <a:latin typeface="+mn-lt"/>
-                <a:ea typeface="+mn-ea"/>
-                <a:cs typeface="+mn-cs"/>
-              </a:defRPr>
-            </a:lvl1pPr>
-            <a:lvl2pPr marL="457200" indent="0" algn="ctr" defTabSz="914400" rtl="0" eaLnBrk="1" latinLnBrk="0" hangingPunct="1">
-              <a:lnSpc>
-                <a:spcPct val="90000"/>
-              </a:lnSpc>
-              <a:spcBef>
-                <a:spcPts val="500"/>
-              </a:spcBef>
-              <a:buFont typeface="Arial" panose="020B0604020202020204" pitchFamily="34" charset="0"/>
-              <a:buNone/>
-              <a:defRPr sz="2000" kern="1200">
-                <a:solidFill>
-                  <a:schemeClr val="tx1"/>
-                </a:solidFill>
-                <a:latin typeface="+mn-lt"/>
-                <a:ea typeface="+mn-ea"/>
-                <a:cs typeface="+mn-cs"/>
-              </a:defRPr>
-            </a:lvl2pPr>
-            <a:lvl3pPr marL="914400" indent="0" algn="ctr" defTabSz="914400" rtl="0" eaLnBrk="1" latinLnBrk="0" hangingPunct="1">
-              <a:lnSpc>
-                <a:spcPct val="90000"/>
-              </a:lnSpc>
-              <a:spcBef>
-                <a:spcPts val="500"/>
-              </a:spcBef>
-              <a:buFont typeface="Arial" panose="020B0604020202020204" pitchFamily="34" charset="0"/>
-              <a:buNone/>
-              <a:defRPr sz="1800" kern="1200">
-                <a:solidFill>
-                  <a:schemeClr val="tx1"/>
-                </a:solidFill>
-                <a:latin typeface="+mn-lt"/>
-                <a:ea typeface="+mn-ea"/>
-                <a:cs typeface="+mn-cs"/>
-              </a:defRPr>
-            </a:lvl3pPr>
-            <a:lvl4pPr marL="1371600" indent="0" algn="ctr" defTabSz="914400" rtl="0" eaLnBrk="1" latinLnBrk="0" hangingPunct="1">
-              <a:lnSpc>
-                <a:spcPct val="90000"/>
-              </a:lnSpc>
-              <a:spcBef>
-                <a:spcPts val="500"/>
-              </a:spcBef>
-              <a:buFont typeface="Arial" panose="020B0604020202020204" pitchFamily="34" charset="0"/>
-              <a:buNone/>
-              <a:defRPr sz="1600" kern="1200">
-                <a:solidFill>
-                  <a:schemeClr val="tx1"/>
-                </a:solidFill>
-                <a:latin typeface="+mn-lt"/>
-                <a:ea typeface="+mn-ea"/>
-                <a:cs typeface="+mn-cs"/>
-              </a:defRPr>
-            </a:lvl4pPr>
-            <a:lvl5pPr marL="1828800" indent="0" algn="ctr" defTabSz="914400" rtl="0" eaLnBrk="1" latinLnBrk="0" hangingPunct="1">
-              <a:lnSpc>
-                <a:spcPct val="90000"/>
-              </a:lnSpc>
-              <a:spcBef>
-                <a:spcPts val="500"/>
-              </a:spcBef>
-              <a:buFont typeface="Arial" panose="020B0604020202020204" pitchFamily="34" charset="0"/>
-              <a:buNone/>
-              <a:defRPr sz="1600" kern="1200">
-                <a:solidFill>
-                  <a:schemeClr val="tx1"/>
-                </a:solidFill>
-                <a:latin typeface="+mn-lt"/>
-                <a:ea typeface="+mn-ea"/>
-                <a:cs typeface="+mn-cs"/>
-              </a:defRPr>
-            </a:lvl5pPr>
-            <a:lvl6pPr marL="2286000" indent="0" algn="ctr" defTabSz="914400" rtl="0" eaLnBrk="1" latinLnBrk="0" hangingPunct="1">
-              <a:lnSpc>
-                <a:spcPct val="90000"/>
-              </a:lnSpc>
-              <a:spcBef>
-                <a:spcPts val="500"/>
-              </a:spcBef>
-              <a:buFont typeface="Arial" panose="020B0604020202020204" pitchFamily="34" charset="0"/>
-              <a:buNone/>
-              <a:defRPr sz="1600" kern="1200">
-                <a:solidFill>
-                  <a:schemeClr val="tx1"/>
-                </a:solidFill>
-                <a:latin typeface="+mn-lt"/>
-                <a:ea typeface="+mn-ea"/>
-                <a:cs typeface="+mn-cs"/>
-              </a:defRPr>
-            </a:lvl6pPr>
-            <a:lvl7pPr marL="2743200" indent="0" algn="ctr" defTabSz="914400" rtl="0" eaLnBrk="1" latinLnBrk="0" hangingPunct="1">
-              <a:lnSpc>
-                <a:spcPct val="90000"/>
-              </a:lnSpc>
-              <a:spcBef>
-                <a:spcPts val="500"/>
-              </a:spcBef>
-              <a:buFont typeface="Arial" panose="020B0604020202020204" pitchFamily="34" charset="0"/>
-              <a:buNone/>
-              <a:defRPr sz="1600" kern="1200">
-                <a:solidFill>
-                  <a:schemeClr val="tx1"/>
-                </a:solidFill>
-                <a:latin typeface="+mn-lt"/>
-                <a:ea typeface="+mn-ea"/>
-                <a:cs typeface="+mn-cs"/>
-              </a:defRPr>
-            </a:lvl7pPr>
-            <a:lvl8pPr marL="3200400" indent="0" algn="ctr" defTabSz="914400" rtl="0" eaLnBrk="1" latinLnBrk="0" hangingPunct="1">
-              <a:lnSpc>
-                <a:spcPct val="90000"/>
-              </a:lnSpc>
-              <a:spcBef>
-                <a:spcPts val="500"/>
-              </a:spcBef>
-              <a:buFont typeface="Arial" panose="020B0604020202020204" pitchFamily="34" charset="0"/>
-              <a:buNone/>
-              <a:defRPr sz="1600" kern="1200">
-                <a:solidFill>
-                  <a:schemeClr val="tx1"/>
-                </a:solidFill>
-                <a:latin typeface="+mn-lt"/>
-                <a:ea typeface="+mn-ea"/>
-                <a:cs typeface="+mn-cs"/>
-              </a:defRPr>
-            </a:lvl8pPr>
-            <a:lvl9pPr marL="3657600" indent="0" algn="ctr" defTabSz="914400" rtl="0" eaLnBrk="1" latinLnBrk="0" hangingPunct="1">
-              <a:lnSpc>
-                <a:spcPct val="90000"/>
-              </a:lnSpc>
-              <a:spcBef>
-                <a:spcPts val="500"/>
-              </a:spcBef>
-              <a:buFont typeface="Arial" panose="020B0604020202020204" pitchFamily="34" charset="0"/>
-              <a:buNone/>
-              <a:defRPr sz="1600" kern="1200">
-                <a:solidFill>
-                  <a:schemeClr val="tx1"/>
-                </a:solidFill>
-                <a:latin typeface="+mn-lt"/>
-                <a:ea typeface="+mn-ea"/>
-                <a:cs typeface="+mn-cs"/>
-              </a:defRPr>
-            </a:lvl9pPr>
-          </a:lstStyle>
-          <a:p>
-            <a:endParaRPr lang="en-US" sz="3200" b="1" dirty="0">
-              <a:solidFill>
-                <a:schemeClr val="accent1">
-                  <a:lumMod val="60000"/>
-                  <a:lumOff val="40000"/>
-                </a:schemeClr>
-              </a:solidFill>
-              <a:latin typeface="MERG_Logo" pitchFamily="2" charset="0"/>
-            </a:endParaRPr>
-          </a:p>
-        </p:txBody>
-      </p:sp>
-      <p:pic>
-        <p:nvPicPr>
-          <p:cNvPr id="10" name="Picture 9">
-            <a:extLst>
-              <a:ext uri="{FF2B5EF4-FFF2-40B4-BE49-F238E27FC236}">
-                <a16:creationId xmlns:a16="http://schemas.microsoft.com/office/drawing/2014/main" id="{411C9DF4-8351-85C6-48AB-6581D3BCC601}"/>
-              </a:ext>
-            </a:extLst>
-          </p:cNvPr>
-          <p:cNvPicPr>
-            <a:picLocks noChangeAspect="1"/>
-          </p:cNvPicPr>
-          <p:nvPr/>
-        </p:nvPicPr>
-        <p:blipFill>
-          <a:blip r:embed="rId2" cstate="email">
-            <a:extLst>
-              <a:ext uri="{28A0092B-C50C-407E-A947-70E740481C1C}">
-                <a14:useLocalDpi xmlns:a14="http://schemas.microsoft.com/office/drawing/2010/main"/>
-              </a:ext>
-            </a:extLst>
-          </a:blip>
-          <a:stretch>
-            <a:fillRect/>
-          </a:stretch>
-        </p:blipFill>
-        <p:spPr>
-          <a:xfrm>
-            <a:off x="10749400" y="6239363"/>
-            <a:ext cx="1116784" cy="496968"/>
-          </a:xfrm>
-          <a:prstGeom prst="rect">
-            <a:avLst/>
-          </a:prstGeom>
-        </p:spPr>
-      </p:pic>
-      <p:pic>
-        <p:nvPicPr>
-          <p:cNvPr id="3" name="Picture 2">
-            <a:extLst>
-              <a:ext uri="{FF2B5EF4-FFF2-40B4-BE49-F238E27FC236}">
-                <a16:creationId xmlns:a16="http://schemas.microsoft.com/office/drawing/2014/main" id="{F625BC8B-FBCB-7B78-8927-67F8FB799916}"/>
-              </a:ext>
-            </a:extLst>
-          </p:cNvPr>
-          <p:cNvPicPr>
-            <a:picLocks noChangeAspect="1"/>
-          </p:cNvPicPr>
-          <p:nvPr/>
-        </p:nvPicPr>
-        <p:blipFill>
-          <a:blip r:embed="rId3" cstate="email">
-            <a:extLst>
-              <a:ext uri="{28A0092B-C50C-407E-A947-70E740481C1C}">
-                <a14:useLocalDpi xmlns:a14="http://schemas.microsoft.com/office/drawing/2010/main"/>
-              </a:ext>
-            </a:extLst>
-          </a:blip>
-          <a:stretch>
-            <a:fillRect/>
-          </a:stretch>
-        </p:blipFill>
-        <p:spPr>
-          <a:xfrm>
-            <a:off x="685801" y="1628519"/>
-            <a:ext cx="7509294" cy="3669672"/>
-          </a:xfrm>
-          <a:prstGeom prst="rect">
-            <a:avLst/>
-          </a:prstGeom>
-        </p:spPr>
-      </p:pic>
     </p:spTree>
     <p:extLst>
       <p:ext uri="{BB962C8B-B14F-4D97-AF65-F5344CB8AC3E}">

</xml_diff>